<commit_message>
Modified Gitflow cheat sheet
</commit_message>
<xml_diff>
--- a/gitflow_cheat_sheet.pptx
+++ b/gitflow_cheat_sheet.pptx
@@ -198,7 +198,7 @@
           <a:p>
             <a:fld id="{CECD4C54-7AA0-42A7-8F95-DA3014E61AEC}" type="datetimeFigureOut">
               <a:rPr lang="en-US" smtClean="0"/>
-              <a:t>2/22/2013</a:t>
+              <a:t>2/26/2013</a:t>
             </a:fld>
             <a:endParaRPr lang="en-US" dirty="0"/>
           </a:p>
@@ -363,7 +363,7 @@
           <a:p>
             <a:fld id="{841E492B-1A82-4F3E-A70C-7F833E6F8060}" type="datetimeFigureOut">
               <a:rPr lang="en-US" smtClean="0"/>
-              <a:t>2/22/2013</a:t>
+              <a:t>2/26/2013</a:t>
             </a:fld>
             <a:endParaRPr lang="en-US" dirty="0"/>
           </a:p>
@@ -1148,7 +1148,7 @@
           <a:p>
             <a:fld id="{257DF2EF-3CEC-4342-9C1B-C11FB715881C}" type="datetimeFigureOut">
               <a:rPr lang="en-US" smtClean="0"/>
-              <a:t>2/21/2013</a:t>
+              <a:t>2/26/2013</a:t>
             </a:fld>
             <a:endParaRPr lang="en-US" dirty="0"/>
           </a:p>
@@ -1318,7 +1318,7 @@
           <a:p>
             <a:fld id="{257DF2EF-3CEC-4342-9C1B-C11FB715881C}" type="datetimeFigureOut">
               <a:rPr lang="en-US" smtClean="0"/>
-              <a:t>2/21/2013</a:t>
+              <a:t>2/26/2013</a:t>
             </a:fld>
             <a:endParaRPr lang="en-US" dirty="0"/>
           </a:p>
@@ -1498,7 +1498,7 @@
           <a:p>
             <a:fld id="{257DF2EF-3CEC-4342-9C1B-C11FB715881C}" type="datetimeFigureOut">
               <a:rPr lang="en-US" smtClean="0"/>
-              <a:t>2/21/2013</a:t>
+              <a:t>2/26/2013</a:t>
             </a:fld>
             <a:endParaRPr lang="en-US" dirty="0"/>
           </a:p>
@@ -1668,7 +1668,7 @@
           <a:p>
             <a:fld id="{257DF2EF-3CEC-4342-9C1B-C11FB715881C}" type="datetimeFigureOut">
               <a:rPr lang="en-US" smtClean="0"/>
-              <a:t>2/21/2013</a:t>
+              <a:t>2/26/2013</a:t>
             </a:fld>
             <a:endParaRPr lang="en-US" dirty="0"/>
           </a:p>
@@ -1914,7 +1914,7 @@
           <a:p>
             <a:fld id="{257DF2EF-3CEC-4342-9C1B-C11FB715881C}" type="datetimeFigureOut">
               <a:rPr lang="en-US" smtClean="0"/>
-              <a:t>2/21/2013</a:t>
+              <a:t>2/26/2013</a:t>
             </a:fld>
             <a:endParaRPr lang="en-US" dirty="0"/>
           </a:p>
@@ -2202,7 +2202,7 @@
           <a:p>
             <a:fld id="{257DF2EF-3CEC-4342-9C1B-C11FB715881C}" type="datetimeFigureOut">
               <a:rPr lang="en-US" smtClean="0"/>
-              <a:t>2/21/2013</a:t>
+              <a:t>2/26/2013</a:t>
             </a:fld>
             <a:endParaRPr lang="en-US" dirty="0"/>
           </a:p>
@@ -2624,7 +2624,7 @@
           <a:p>
             <a:fld id="{257DF2EF-3CEC-4342-9C1B-C11FB715881C}" type="datetimeFigureOut">
               <a:rPr lang="en-US" smtClean="0"/>
-              <a:t>2/21/2013</a:t>
+              <a:t>2/26/2013</a:t>
             </a:fld>
             <a:endParaRPr lang="en-US" dirty="0"/>
           </a:p>
@@ -2742,7 +2742,7 @@
           <a:p>
             <a:fld id="{257DF2EF-3CEC-4342-9C1B-C11FB715881C}" type="datetimeFigureOut">
               <a:rPr lang="en-US" smtClean="0"/>
-              <a:t>2/21/2013</a:t>
+              <a:t>2/26/2013</a:t>
             </a:fld>
             <a:endParaRPr lang="en-US" dirty="0"/>
           </a:p>
@@ -2837,7 +2837,7 @@
           <a:p>
             <a:fld id="{257DF2EF-3CEC-4342-9C1B-C11FB715881C}" type="datetimeFigureOut">
               <a:rPr lang="en-US" smtClean="0"/>
-              <a:t>2/21/2013</a:t>
+              <a:t>2/26/2013</a:t>
             </a:fld>
             <a:endParaRPr lang="en-US" dirty="0"/>
           </a:p>
@@ -3114,7 +3114,7 @@
           <a:p>
             <a:fld id="{257DF2EF-3CEC-4342-9C1B-C11FB715881C}" type="datetimeFigureOut">
               <a:rPr lang="en-US" smtClean="0"/>
-              <a:t>2/21/2013</a:t>
+              <a:t>2/26/2013</a:t>
             </a:fld>
             <a:endParaRPr lang="en-US" dirty="0"/>
           </a:p>
@@ -3367,7 +3367,7 @@
           <a:p>
             <a:fld id="{257DF2EF-3CEC-4342-9C1B-C11FB715881C}" type="datetimeFigureOut">
               <a:rPr lang="en-US" smtClean="0"/>
-              <a:t>2/21/2013</a:t>
+              <a:t>2/26/2013</a:t>
             </a:fld>
             <a:endParaRPr lang="en-US" dirty="0"/>
           </a:p>
@@ -3580,7 +3580,7 @@
           <a:p>
             <a:fld id="{257DF2EF-3CEC-4342-9C1B-C11FB715881C}" type="datetimeFigureOut">
               <a:rPr lang="en-US" smtClean="0"/>
-              <a:t>2/21/2013</a:t>
+              <a:t>2/26/2013</a:t>
             </a:fld>
             <a:endParaRPr lang="en-US" dirty="0"/>
           </a:p>
@@ -4153,37 +4153,7 @@
                 <a:latin typeface="Arial" pitchFamily="34" charset="0"/>
                 <a:cs typeface="Arial" pitchFamily="34" charset="0"/>
               </a:rPr>
-              <a:t>Universität </a:t>
-            </a:r>
-            <a:r>
-              <a:rPr lang="de-DE" sz="1400" dirty="0" smtClean="0">
-                <a:solidFill>
-                  <a:schemeClr val="bg1"/>
-                </a:solidFill>
-                <a:latin typeface="Arial" pitchFamily="34" charset="0"/>
-                <a:cs typeface="Arial" pitchFamily="34" charset="0"/>
-              </a:rPr>
-              <a:t>Stuttgart, Institut </a:t>
-            </a:r>
-            <a:r>
-              <a:rPr lang="de-DE" sz="1400" dirty="0" smtClean="0">
-                <a:solidFill>
-                  <a:schemeClr val="bg1"/>
-                </a:solidFill>
-                <a:latin typeface="Arial" pitchFamily="34" charset="0"/>
-                <a:cs typeface="Arial" pitchFamily="34" charset="0"/>
-              </a:rPr>
-              <a:t>für Technische und Numerische </a:t>
-            </a:r>
-            <a:r>
-              <a:rPr lang="de-DE" sz="1400" dirty="0" smtClean="0">
-                <a:solidFill>
-                  <a:schemeClr val="bg1"/>
-                </a:solidFill>
-                <a:latin typeface="Arial" pitchFamily="34" charset="0"/>
-                <a:cs typeface="Arial" pitchFamily="34" charset="0"/>
-              </a:rPr>
-              <a:t>Mechanik		Profs</a:t>
+              <a:t>Universität Stuttgart, Institut für Technische und Numerische Mechanik		Profs</a:t>
             </a:r>
             <a:r>
               <a:rPr lang="de-DE" sz="1400" dirty="0">
@@ -4647,13 +4617,6 @@
               </a:rPr>
               <a:t>Overview of Gitflow Commands</a:t>
             </a:r>
-            <a:endParaRPr lang="en-US" sz="1600" b="1" dirty="0" smtClean="0">
-              <a:solidFill>
-                <a:srgbClr val="558ED5"/>
-              </a:solidFill>
-              <a:latin typeface="Arial" pitchFamily="34" charset="0"/>
-              <a:cs typeface="Arial" pitchFamily="34" charset="0"/>
-            </a:endParaRPr>
           </a:p>
         </p:txBody>
       </p:sp>
@@ -8240,37 +8203,7 @@
                 <a:latin typeface="Arial" pitchFamily="34" charset="0"/>
                 <a:cs typeface="Arial" pitchFamily="34" charset="0"/>
               </a:rPr>
-              <a:t>Universität </a:t>
-            </a:r>
-            <a:r>
-              <a:rPr lang="de-DE" sz="1400" dirty="0" smtClean="0">
-                <a:solidFill>
-                  <a:schemeClr val="bg1"/>
-                </a:solidFill>
-                <a:latin typeface="Arial" pitchFamily="34" charset="0"/>
-                <a:cs typeface="Arial" pitchFamily="34" charset="0"/>
-              </a:rPr>
-              <a:t>Stuttgart, Institut </a:t>
-            </a:r>
-            <a:r>
-              <a:rPr lang="de-DE" sz="1400" dirty="0" smtClean="0">
-                <a:solidFill>
-                  <a:schemeClr val="bg1"/>
-                </a:solidFill>
-                <a:latin typeface="Arial" pitchFamily="34" charset="0"/>
-                <a:cs typeface="Arial" pitchFamily="34" charset="0"/>
-              </a:rPr>
-              <a:t>für Technische und Numerische </a:t>
-            </a:r>
-            <a:r>
-              <a:rPr lang="de-DE" sz="1400" dirty="0" smtClean="0">
-                <a:solidFill>
-                  <a:schemeClr val="bg1"/>
-                </a:solidFill>
-                <a:latin typeface="Arial" pitchFamily="34" charset="0"/>
-                <a:cs typeface="Arial" pitchFamily="34" charset="0"/>
-              </a:rPr>
-              <a:t>Mechanik		Profs</a:t>
+              <a:t>Universität Stuttgart, Institut für Technische und Numerische Mechanik		Profs</a:t>
             </a:r>
             <a:r>
               <a:rPr lang="de-DE" sz="1400" dirty="0">
@@ -8565,14 +8498,7 @@
                 <a:latin typeface="Arial" pitchFamily="34" charset="0"/>
                 <a:cs typeface="Arial" pitchFamily="34" charset="0"/>
               </a:rPr>
-              <a:t>: </a:t>
-            </a:r>
-            <a:r>
-              <a:rPr lang="en-US" sz="1600" dirty="0" smtClean="0">
-                <a:latin typeface="Arial" pitchFamily="34" charset="0"/>
-                <a:cs typeface="Arial" pitchFamily="34" charset="0"/>
-              </a:rPr>
-              <a:t>Base of the feature branch to be created (default = develop branch).</a:t>
+              <a:t>: Base of the feature branch to be created (default = develop branch).</a:t>
             </a:r>
           </a:p>
           <a:p>
@@ -9069,14 +8995,7 @@
                 <a:latin typeface="Arial" pitchFamily="34" charset="0"/>
                 <a:cs typeface="Arial" pitchFamily="34" charset="0"/>
               </a:rPr>
-              <a:t>:</a:t>
-            </a:r>
-            <a:r>
-              <a:rPr lang="en-US" sz="1600" dirty="0" smtClean="0">
-                <a:latin typeface="Arial" pitchFamily="34" charset="0"/>
-                <a:cs typeface="Arial" pitchFamily="34" charset="0"/>
-              </a:rPr>
-              <a:t> Version tag of the released version to be fixed.</a:t>
+              <a:t>: Version tag of the released version to be fixed.</a:t>
             </a:r>
           </a:p>
           <a:p>
@@ -9606,37 +9525,7 @@
                 <a:latin typeface="Arial" pitchFamily="34" charset="0"/>
                 <a:cs typeface="Arial" pitchFamily="34" charset="0"/>
               </a:rPr>
-              <a:t>Universität </a:t>
-            </a:r>
-            <a:r>
-              <a:rPr lang="de-DE" sz="1400" dirty="0" smtClean="0">
-                <a:solidFill>
-                  <a:schemeClr val="bg1"/>
-                </a:solidFill>
-                <a:latin typeface="Arial" pitchFamily="34" charset="0"/>
-                <a:cs typeface="Arial" pitchFamily="34" charset="0"/>
-              </a:rPr>
-              <a:t>Stuttgart, Institut </a:t>
-            </a:r>
-            <a:r>
-              <a:rPr lang="de-DE" sz="1400" dirty="0" smtClean="0">
-                <a:solidFill>
-                  <a:schemeClr val="bg1"/>
-                </a:solidFill>
-                <a:latin typeface="Arial" pitchFamily="34" charset="0"/>
-                <a:cs typeface="Arial" pitchFamily="34" charset="0"/>
-              </a:rPr>
-              <a:t>für Technische und Numerische </a:t>
-            </a:r>
-            <a:r>
-              <a:rPr lang="de-DE" sz="1400" dirty="0" smtClean="0">
-                <a:solidFill>
-                  <a:schemeClr val="bg1"/>
-                </a:solidFill>
-                <a:latin typeface="Arial" pitchFamily="34" charset="0"/>
-                <a:cs typeface="Arial" pitchFamily="34" charset="0"/>
-              </a:rPr>
-              <a:t>Mechanik		Profs</a:t>
+              <a:t>Universität Stuttgart, Institut für Technische und Numerische Mechanik		Profs</a:t>
             </a:r>
             <a:r>
               <a:rPr lang="de-DE" sz="1400" dirty="0">
@@ -9790,17 +9679,7 @@
                 <a:latin typeface="Arial" pitchFamily="34" charset="0"/>
                 <a:cs typeface="Arial" pitchFamily="34" charset="0"/>
               </a:rPr>
-              <a:t>gf support &lt;action&gt; </a:t>
-            </a:r>
-            <a:r>
-              <a:rPr lang="en-US" sz="1600" dirty="0" smtClean="0">
-                <a:solidFill>
-                  <a:srgbClr val="558ED5"/>
-                </a:solidFill>
-                <a:latin typeface="Arial" pitchFamily="34" charset="0"/>
-                <a:cs typeface="Arial" pitchFamily="34" charset="0"/>
-              </a:rPr>
-              <a:t>[flags] [&lt;name&gt; [&lt;base&gt;]]</a:t>
+              <a:t>gf support &lt;action&gt; [flags] [&lt;name&gt; [&lt;base&gt;]]</a:t>
             </a:r>
           </a:p>
           <a:p>
@@ -9943,10 +9822,6 @@
               </a:rPr>
               <a:t>: Base of the support branch to be created (a branch name or a version 			tag).</a:t>
             </a:r>
-            <a:endParaRPr lang="en-US" sz="1600" dirty="0" smtClean="0">
-              <a:latin typeface="Arial" pitchFamily="34" charset="0"/>
-              <a:cs typeface="Arial" pitchFamily="34" charset="0"/>
-            </a:endParaRPr>
           </a:p>
           <a:p>
             <a:pPr marL="285750" indent="-285750">
@@ -10191,21 +10066,7 @@
                 <a:latin typeface="Arial" pitchFamily="34" charset="0"/>
                 <a:cs typeface="Arial" pitchFamily="34" charset="0"/>
               </a:rPr>
-              <a:t>: Create a new local release branch and the corresponding remote branch. The new release branch will be named automatically by the ITM </a:t>
-            </a:r>
-            <a:r>
-              <a:rPr lang="en-US" sz="1600" dirty="0" smtClean="0">
-                <a:latin typeface="Arial" pitchFamily="34" charset="0"/>
-                <a:cs typeface="Arial" pitchFamily="34" charset="0"/>
-              </a:rPr>
-              <a:t>Gitflow script </a:t>
-            </a:r>
-            <a:r>
-              <a:rPr lang="en-US" sz="1600" dirty="0" smtClean="0">
-                <a:latin typeface="Arial" pitchFamily="34" charset="0"/>
-                <a:cs typeface="Arial" pitchFamily="34" charset="0"/>
-              </a:rPr>
-              <a:t>based on the already assigned release version tags.</a:t>
+              <a:t>: Create a new local release branch and the corresponding remote branch. The new release branch will be named automatically by the ITM Gitflow script based on the already assigned release version tags.</a:t>
             </a:r>
           </a:p>
           <a:p>
@@ -10233,14 +10094,7 @@
                 <a:latin typeface="Arial" pitchFamily="34" charset="0"/>
                 <a:cs typeface="Arial" pitchFamily="34" charset="0"/>
               </a:rPr>
-              <a:t>:</a:t>
-            </a:r>
-            <a:r>
-              <a:rPr lang="en-US" sz="1600" dirty="0" smtClean="0">
-                <a:latin typeface="Arial" pitchFamily="34" charset="0"/>
-                <a:cs typeface="Arial" pitchFamily="34" charset="0"/>
-              </a:rPr>
-              <a:t> Create a release branch in order to prepare a major release, i.e. an 			upgrade (the first number of the version tag is incremented).</a:t>
+              <a:t>: Create a release branch in order to prepare a major release, i.e. an 			upgrade (the first number of the version tag is incremented).</a:t>
             </a:r>
           </a:p>
           <a:p>
@@ -10377,21 +10231,7 @@
                 <a:latin typeface="Arial" pitchFamily="34" charset="0"/>
                 <a:cs typeface="Arial" pitchFamily="34" charset="0"/>
               </a:rPr>
-              <a:t>: Keep both the local and the remote release branch after having merged and tagged </a:t>
-            </a:r>
-            <a:r>
-              <a:rPr lang="en-US" sz="1600" dirty="0" smtClean="0">
-                <a:latin typeface="Arial" pitchFamily="34" charset="0"/>
-                <a:cs typeface="Arial" pitchFamily="34" charset="0"/>
-              </a:rPr>
-              <a:t>them</a:t>
-            </a:r>
-            <a:r>
-              <a:rPr lang="en-US" sz="1600" dirty="0" smtClean="0">
-                <a:latin typeface="Arial" pitchFamily="34" charset="0"/>
-                <a:cs typeface="Arial" pitchFamily="34" charset="0"/>
-              </a:rPr>
-              <a:t>.</a:t>
+              <a:t>: Keep both the local and the remote release branch after having merged and tagged them.</a:t>
             </a:r>
           </a:p>
           <a:p>
@@ -10773,37 +10613,7 @@
                 <a:latin typeface="Arial" pitchFamily="34" charset="0"/>
                 <a:cs typeface="Arial" pitchFamily="34" charset="0"/>
               </a:rPr>
-              <a:t>Universität </a:t>
-            </a:r>
-            <a:r>
-              <a:rPr lang="de-DE" sz="1400" dirty="0" smtClean="0">
-                <a:solidFill>
-                  <a:schemeClr val="bg1"/>
-                </a:solidFill>
-                <a:latin typeface="Arial" pitchFamily="34" charset="0"/>
-                <a:cs typeface="Arial" pitchFamily="34" charset="0"/>
-              </a:rPr>
-              <a:t>Stuttgart, Institut </a:t>
-            </a:r>
-            <a:r>
-              <a:rPr lang="de-DE" sz="1400" dirty="0" smtClean="0">
-                <a:solidFill>
-                  <a:schemeClr val="bg1"/>
-                </a:solidFill>
-                <a:latin typeface="Arial" pitchFamily="34" charset="0"/>
-                <a:cs typeface="Arial" pitchFamily="34" charset="0"/>
-              </a:rPr>
-              <a:t>für Technische und Numerische </a:t>
-            </a:r>
-            <a:r>
-              <a:rPr lang="de-DE" sz="1400" dirty="0" smtClean="0">
-                <a:solidFill>
-                  <a:schemeClr val="bg1"/>
-                </a:solidFill>
-                <a:latin typeface="Arial" pitchFamily="34" charset="0"/>
-                <a:cs typeface="Arial" pitchFamily="34" charset="0"/>
-              </a:rPr>
-              <a:t>Mechanik		Profs</a:t>
+              <a:t>Universität Stuttgart, Institut für Technische und Numerische Mechanik		Profs</a:t>
             </a:r>
             <a:r>
               <a:rPr lang="de-DE" sz="1400" dirty="0">
@@ -11105,21 +10915,7 @@
                 <a:latin typeface="Arial" pitchFamily="34" charset="0"/>
                 <a:cs typeface="Arial" pitchFamily="34" charset="0"/>
               </a:rPr>
-              <a:t>To gain the advantages provided by </a:t>
-            </a:r>
-            <a:r>
-              <a:rPr lang="en-US" sz="1600" dirty="0" smtClean="0">
-                <a:latin typeface="Arial" pitchFamily="34" charset="0"/>
-                <a:cs typeface="Arial" pitchFamily="34" charset="0"/>
-              </a:rPr>
-              <a:t>Vincent Driessen</a:t>
-            </a:r>
-            <a:r>
-              <a:rPr lang="en-US" sz="1600" dirty="0" smtClean="0">
-                <a:latin typeface="Arial" pitchFamily="34" charset="0"/>
-                <a:cs typeface="Arial" pitchFamily="34" charset="0"/>
-              </a:rPr>
-              <a:t>’s development model, it is necessary to observe all the rules established by its extensive guideline framework. In order to make the usage of the model much simpler, reduce the required maintenance effort and get new developers up to speed more quickly, the so-called ITM Gitflow script package, based on the Git-Flow command collection (</a:t>
+              <a:t>To gain the advantages provided by Vincent Driessen’s development model, it is necessary to observe all the rules established by its extensive guideline framework. In order to make the usage of the model much simpler, reduce the required maintenance effort and get new developers up to speed more quickly, the so-called ITM Gitflow script package, based on the Git-Flow command collection (</a:t>
             </a:r>
             <a:r>
               <a:rPr lang="en-US" sz="1600" dirty="0" smtClean="0">
@@ -11156,21 +10952,7 @@
                 <a:latin typeface="Arial" pitchFamily="34" charset="0"/>
                 <a:cs typeface="Arial" pitchFamily="34" charset="0"/>
               </a:rPr>
-              <a:t>)</a:t>
-            </a:r>
-            <a:r>
-              <a:rPr lang="en-US" sz="1600" dirty="0" smtClean="0">
-                <a:latin typeface="Arial" pitchFamily="34" charset="0"/>
-                <a:cs typeface="Arial" pitchFamily="34" charset="0"/>
-              </a:rPr>
-              <a:t>, is introduced </a:t>
-            </a:r>
-            <a:r>
-              <a:rPr lang="en-US" sz="1600" dirty="0" smtClean="0">
-                <a:latin typeface="Arial" pitchFamily="34" charset="0"/>
-                <a:cs typeface="Arial" pitchFamily="34" charset="0"/>
-              </a:rPr>
-              <a:t>providing high-level repository operations for the presented Git branching model.</a:t>
+              <a:t>), is introduced providing high-level repository operations for the presented Git branching model.</a:t>
             </a:r>
           </a:p>
         </p:txBody>
@@ -11258,14 +11040,7 @@
                 <a:latin typeface="Arial" pitchFamily="34" charset="0"/>
                 <a:cs typeface="Arial" pitchFamily="34" charset="0"/>
               </a:rPr>
-              <a:t>Read the article </a:t>
-            </a:r>
-            <a:r>
-              <a:rPr lang="en-US" sz="1600" dirty="0" smtClean="0">
-                <a:latin typeface="Arial" pitchFamily="34" charset="0"/>
-                <a:cs typeface="Arial" pitchFamily="34" charset="0"/>
-              </a:rPr>
-              <a:t>“A successful Git branching model” (</a:t>
+              <a:t>Read the article “A successful Git branching model” (</a:t>
             </a:r>
             <a:r>
               <a:rPr lang="en-US" sz="1600" dirty="0" smtClean="0">
@@ -11282,14 +11057,7 @@
                 <a:latin typeface="Arial" pitchFamily="34" charset="0"/>
                 <a:cs typeface="Arial" pitchFamily="34" charset="0"/>
               </a:rPr>
-              <a:t>) published by </a:t>
-            </a:r>
-            <a:r>
-              <a:rPr lang="en-US" sz="1600" dirty="0" smtClean="0">
-                <a:latin typeface="Arial" pitchFamily="34" charset="0"/>
-                <a:cs typeface="Arial" pitchFamily="34" charset="0"/>
-              </a:rPr>
-              <a:t>Vincent </a:t>
+              <a:t>) published by Vincent </a:t>
             </a:r>
             <a:r>
               <a:rPr lang="en-US" sz="1600" dirty="0">
@@ -11395,19 +11163,8 @@
                 <a:latin typeface="Arial" pitchFamily="34" charset="0"/>
                 <a:cs typeface="Arial" pitchFamily="34" charset="0"/>
               </a:rPr>
-              <a:t>Start enjoying the flexibility and simplicity of usage provided by the </a:t>
-            </a:r>
-            <a:r>
-              <a:rPr lang="en-US" sz="1600" dirty="0" smtClean="0">
-                <a:latin typeface="Arial" pitchFamily="34" charset="0"/>
-                <a:cs typeface="Arial" pitchFamily="34" charset="0"/>
-              </a:rPr>
-              <a:t>ITM Gitflow script package.</a:t>
-            </a:r>
-            <a:endParaRPr lang="en-US" sz="1600" dirty="0" smtClean="0">
-              <a:latin typeface="Arial" pitchFamily="34" charset="0"/>
-              <a:cs typeface="Arial" pitchFamily="34" charset="0"/>
-            </a:endParaRPr>
+              <a:t>Start enjoying the flexibility and simplicity of usage provided by the ITM Gitflow script package.</a:t>
+            </a:r>
           </a:p>
         </p:txBody>
       </p:sp>
@@ -11505,10 +11262,6 @@
               </a:rPr>
               <a:t>Record the current status of the inoperative repository and write a brief description of the problem.</a:t>
             </a:r>
-            <a:endParaRPr lang="en-US" sz="1600" dirty="0" smtClean="0">
-              <a:latin typeface="Arial" pitchFamily="34" charset="0"/>
-              <a:cs typeface="Arial" pitchFamily="34" charset="0"/>
-            </a:endParaRPr>
           </a:p>
           <a:p>
             <a:pPr marL="285750" indent="-285750">
@@ -11659,19 +11412,8 @@
                 <a:latin typeface="Arial" pitchFamily="34" charset="0"/>
                 <a:cs typeface="Arial" pitchFamily="34" charset="0"/>
               </a:rPr>
-              <a:t>here are specific Gitflow “commit” and “reset” subcommands availab</a:t>
-            </a:r>
-            <a:r>
-              <a:rPr lang="en-US" sz="1600" dirty="0" smtClean="0">
-                <a:latin typeface="Arial" pitchFamily="34" charset="0"/>
-                <a:cs typeface="Arial" pitchFamily="34" charset="0"/>
-              </a:rPr>
-              <a:t>le, which perform an additional push at the end of the commit or reset process in comparison to the according standard Git commands. It could be a good idea to use both the specific and the standard subcommand depending on the situation.</a:t>
-            </a:r>
-            <a:endParaRPr lang="en-US" sz="1600" dirty="0" smtClean="0">
-              <a:latin typeface="Arial" pitchFamily="34" charset="0"/>
-              <a:cs typeface="Arial" pitchFamily="34" charset="0"/>
-            </a:endParaRPr>
+              <a:t>here are specific Gitflow “commit” and “reset” subcommands available, which perform an additional push at the end of the commit or reset process in comparison to the according standard Git commands. It could be a good idea to use both the specific and the standard subcommand depending on the situation.</a:t>
+            </a:r>
           </a:p>
           <a:p>
             <a:pPr marL="285750" indent="-285750">
@@ -11686,28 +11428,7 @@
                 <a:latin typeface="Arial" pitchFamily="34" charset="0"/>
                 <a:cs typeface="Arial" pitchFamily="34" charset="0"/>
               </a:rPr>
-              <a:t>For</a:t>
-            </a:r>
-            <a:r>
-              <a:rPr lang="en-US" sz="1600" dirty="0" smtClean="0">
-                <a:latin typeface="Arial" pitchFamily="34" charset="0"/>
-                <a:cs typeface="Arial" pitchFamily="34" charset="0"/>
-              </a:rPr>
-              <a:t> all other actions except cloning and resetting a repository as well as committing changes make use of the standard Git subcommands, e.g. </a:t>
-            </a:r>
-            <a:r>
-              <a:rPr lang="en-US" sz="1600" dirty="0" smtClean="0">
-                <a:latin typeface="Arial" pitchFamily="34" charset="0"/>
-                <a:cs typeface="Arial" pitchFamily="34" charset="0"/>
-              </a:rPr>
-              <a:t>“git add”, “git move”, “git pull” and “git checkout”</a:t>
-            </a:r>
-            <a:r>
-              <a:rPr lang="en-US" sz="1600" dirty="0" smtClean="0">
-                <a:latin typeface="Arial" pitchFamily="34" charset="0"/>
-                <a:cs typeface="Arial" pitchFamily="34" charset="0"/>
-              </a:rPr>
-              <a:t>.</a:t>
+              <a:t>For all other actions except cloning and resetting a repository as well as committing changes make use of the standard Git subcommands, e.g. “git add”, “git move”, “git pull” and “git checkout”.</a:t>
             </a:r>
           </a:p>
         </p:txBody>

</xml_diff>